<commit_message>
Add upcoming events to the slides
</commit_message>
<xml_diff>
--- a/iotschema-17may20218.pptx
+++ b/iotschema-17may20218.pptx
@@ -5,7 +5,7 @@
     <p:sldMasterId id="2147483660" r:id="rId1"/>
   </p:sldMasterIdLst>
   <p:notesMasterIdLst>
-    <p:notesMasterId r:id="rId25"/>
+    <p:notesMasterId r:id="rId26"/>
   </p:notesMasterIdLst>
   <p:sldIdLst>
     <p:sldId id="256" r:id="rId2"/>
@@ -30,7 +30,8 @@
     <p:sldId id="263" r:id="rId21"/>
     <p:sldId id="264" r:id="rId22"/>
     <p:sldId id="267" r:id="rId23"/>
-    <p:sldId id="268" r:id="rId24"/>
+    <p:sldId id="283" r:id="rId24"/>
+    <p:sldId id="268" r:id="rId25"/>
   </p:sldIdLst>
   <p:sldSz cx="9144000" cy="6858000" type="letter"/>
   <p:notesSz cx="6858000" cy="9144000"/>
@@ -6080,6 +6081,133 @@
 </file>
 
 <file path=ppt/slides/slide23.xml><?xml version="1.0" encoding="utf-8"?>
+<p:sld xmlns:a="http://schemas.openxmlformats.org/drawingml/2006/main" xmlns:r="http://schemas.openxmlformats.org/officeDocument/2006/relationships" xmlns:p="http://schemas.openxmlformats.org/presentationml/2006/main">
+  <p:cSld>
+    <p:spTree>
+      <p:nvGrpSpPr>
+        <p:cNvPr id="1" name=""/>
+        <p:cNvGrpSpPr/>
+        <p:nvPr/>
+      </p:nvGrpSpPr>
+      <p:grpSpPr>
+        <a:xfrm>
+          <a:off x="0" y="0"/>
+          <a:ext cx="0" cy="0"/>
+          <a:chOff x="0" y="0"/>
+          <a:chExt cx="0" cy="0"/>
+        </a:xfrm>
+      </p:grpSpPr>
+      <p:sp>
+        <p:nvSpPr>
+          <p:cNvPr id="2" name="Title 1"/>
+          <p:cNvSpPr>
+            <a:spLocks noGrp="1"/>
+          </p:cNvSpPr>
+          <p:nvPr>
+            <p:ph type="title"/>
+          </p:nvPr>
+        </p:nvSpPr>
+        <p:spPr/>
+        <p:txBody>
+          <a:bodyPr/>
+          <a:lstStyle/>
+          <a:p>
+            <a:r>
+              <a:rPr lang="en-US" dirty="0" smtClean="0"/>
+              <a:t>Upcoming Semantic Interop Events</a:t>
+            </a:r>
+            <a:endParaRPr lang="en-US" dirty="0"/>
+          </a:p>
+        </p:txBody>
+      </p:sp>
+      <p:sp>
+        <p:nvSpPr>
+          <p:cNvPr id="3" name="Content Placeholder 2"/>
+          <p:cNvSpPr>
+            <a:spLocks noGrp="1"/>
+          </p:cNvSpPr>
+          <p:nvPr>
+            <p:ph idx="1"/>
+          </p:nvPr>
+        </p:nvSpPr>
+        <p:spPr>
+          <a:xfrm>
+            <a:off x="628650" y="2043834"/>
+            <a:ext cx="7886700" cy="4351338"/>
+          </a:xfrm>
+        </p:spPr>
+        <p:txBody>
+          <a:bodyPr/>
+          <a:lstStyle/>
+          <a:p>
+            <a:r>
+              <a:rPr lang="en-US" dirty="0" smtClean="0"/>
+              <a:t>W3C Web of Things </a:t>
+            </a:r>
+            <a:r>
+              <a:rPr lang="en-US" dirty="0" err="1" smtClean="0"/>
+              <a:t>Plugfest</a:t>
+            </a:r>
+            <a:endParaRPr lang="en-US" dirty="0" smtClean="0"/>
+          </a:p>
+          <a:p>
+            <a:pPr lvl="1"/>
+            <a:r>
+              <a:rPr lang="en-US" dirty="0" smtClean="0"/>
+              <a:t>South Korea, June 30</a:t>
+            </a:r>
+            <a:r>
+              <a:rPr lang="en-US" baseline="30000" dirty="0" smtClean="0"/>
+              <a:t>th</a:t>
+            </a:r>
+            <a:r>
+              <a:rPr lang="en-US" dirty="0" smtClean="0"/>
+              <a:t> and July 1</a:t>
+            </a:r>
+            <a:r>
+              <a:rPr lang="en-US" baseline="30000" dirty="0" smtClean="0"/>
+              <a:t>st</a:t>
+            </a:r>
+            <a:endParaRPr lang="en-US" dirty="0" smtClean="0"/>
+          </a:p>
+          <a:p>
+            <a:r>
+              <a:rPr lang="en-US" dirty="0" smtClean="0"/>
+              <a:t>WISHI </a:t>
+            </a:r>
+            <a:r>
+              <a:rPr lang="en-US" dirty="0" err="1" smtClean="0"/>
+              <a:t>Plugfest</a:t>
+            </a:r>
+            <a:r>
+              <a:rPr lang="en-US" dirty="0" smtClean="0"/>
+              <a:t>/Hackathon at IETF 102</a:t>
+            </a:r>
+          </a:p>
+          <a:p>
+            <a:pPr lvl="1"/>
+            <a:r>
+              <a:rPr lang="en-US" dirty="0" smtClean="0"/>
+              <a:t>Montreal, July 14th and 15th</a:t>
+            </a:r>
+            <a:endParaRPr lang="en-US" dirty="0"/>
+          </a:p>
+        </p:txBody>
+      </p:sp>
+    </p:spTree>
+    <p:extLst>
+      <p:ext uri="{BB962C8B-B14F-4D97-AF65-F5344CB8AC3E}">
+        <p14:creationId xmlns:p14="http://schemas.microsoft.com/office/powerpoint/2010/main" val="911280416"/>
+      </p:ext>
+    </p:extLst>
+  </p:cSld>
+  <p:clrMapOvr>
+    <a:masterClrMapping/>
+  </p:clrMapOvr>
+</p:sld>
+</file>
+
+<file path=ppt/slides/slide24.xml><?xml version="1.0" encoding="utf-8"?>
 <p:sld xmlns:a="http://schemas.openxmlformats.org/drawingml/2006/main" xmlns:r="http://schemas.openxmlformats.org/officeDocument/2006/relationships" xmlns:p="http://schemas.openxmlformats.org/presentationml/2006/main">
   <p:cSld>
     <p:spTree>

</xml_diff>

<commit_message>
Figure - Integration of Haystack vocabulary in iot.schema.org updated.
</commit_message>
<xml_diff>
--- a/iotschema-17may20218.pptx
+++ b/iotschema-17may20218.pptx
@@ -132,7 +132,7 @@
   </p:defaultTextStyle>
   <p:extLst>
     <p:ext uri="{EFAFB233-063F-42B5-8137-9DF3F51BA10A}">
-      <p15:sldGuideLst xmlns:p15="http://schemas.microsoft.com/office/powerpoint/2012/main"/>
+      <p15:sldGuideLst xmlns:p15="http://schemas.microsoft.com/office/powerpoint/2012/main" xmlns=""/>
     </p:ext>
   </p:extLst>
 </p:presentation>
@@ -220,7 +220,8 @@
           <a:p>
             <a:fld id="{17C8783D-F440-ED43-8E82-B584645D9A87}" type="datetimeFigureOut">
               <a:rPr lang="en-US" smtClean="0"/>
-              <a:t>5/16/18</a:t>
+              <a:pPr/>
+              <a:t>5/17/2018</a:t>
             </a:fld>
             <a:endParaRPr lang="en-US"/>
           </a:p>
@@ -379,7 +380,8 @@
           <a:p>
             <a:fld id="{A53D0683-6165-0C4A-9295-086A6FCA8D0C}" type="slidenum">
               <a:rPr lang="en-US" smtClean="0"/>
-              <a:t>‹#›</a:t>
+              <a:pPr/>
+              <a:t>‹Nr.›</a:t>
             </a:fld>
             <a:endParaRPr lang="en-US"/>
           </a:p>
@@ -388,7 +390,7 @@
     </p:spTree>
     <p:extLst>
       <p:ext uri="{BB962C8B-B14F-4D97-AF65-F5344CB8AC3E}">
-        <p14:creationId xmlns:p14="http://schemas.microsoft.com/office/powerpoint/2010/main" val="1441227132"/>
+        <p14:creationId xmlns:p14="http://schemas.microsoft.com/office/powerpoint/2010/main" xmlns="" val="1441227132"/>
       </p:ext>
     </p:extLst>
   </p:cSld>
@@ -619,7 +621,8 @@
           <a:p>
             <a:fld id="{A37A7497-B40A-2944-AF6C-6A4B11C9A644}" type="datetimeFigureOut">
               <a:rPr lang="en-US" smtClean="0"/>
-              <a:t>5/16/18</a:t>
+              <a:pPr/>
+              <a:t>5/17/2018</a:t>
             </a:fld>
             <a:endParaRPr lang="en-US"/>
           </a:p>
@@ -661,7 +664,8 @@
           <a:p>
             <a:fld id="{8E4E1ED5-99F9-634F-AEAC-E940F1B4F904}" type="slidenum">
               <a:rPr lang="en-US" smtClean="0"/>
-              <a:t>‹#›</a:t>
+              <a:pPr/>
+              <a:t>‹Nr.›</a:t>
             </a:fld>
             <a:endParaRPr lang="en-US"/>
           </a:p>
@@ -784,7 +788,8 @@
           <a:p>
             <a:fld id="{A37A7497-B40A-2944-AF6C-6A4B11C9A644}" type="datetimeFigureOut">
               <a:rPr lang="en-US" smtClean="0"/>
-              <a:t>5/16/18</a:t>
+              <a:pPr/>
+              <a:t>5/17/2018</a:t>
             </a:fld>
             <a:endParaRPr lang="en-US"/>
           </a:p>
@@ -826,7 +831,8 @@
           <a:p>
             <a:fld id="{8E4E1ED5-99F9-634F-AEAC-E940F1B4F904}" type="slidenum">
               <a:rPr lang="en-US" smtClean="0"/>
-              <a:t>‹#›</a:t>
+              <a:pPr/>
+              <a:t>‹Nr.›</a:t>
             </a:fld>
             <a:endParaRPr lang="en-US"/>
           </a:p>
@@ -959,7 +965,8 @@
           <a:p>
             <a:fld id="{A37A7497-B40A-2944-AF6C-6A4B11C9A644}" type="datetimeFigureOut">
               <a:rPr lang="en-US" smtClean="0"/>
-              <a:t>5/16/18</a:t>
+              <a:pPr/>
+              <a:t>5/17/2018</a:t>
             </a:fld>
             <a:endParaRPr lang="en-US"/>
           </a:p>
@@ -1001,7 +1008,8 @@
           <a:p>
             <a:fld id="{8E4E1ED5-99F9-634F-AEAC-E940F1B4F904}" type="slidenum">
               <a:rPr lang="en-US" smtClean="0"/>
-              <a:t>‹#›</a:t>
+              <a:pPr/>
+              <a:t>‹Nr.›</a:t>
             </a:fld>
             <a:endParaRPr lang="en-US"/>
           </a:p>
@@ -1124,7 +1132,8 @@
           <a:p>
             <a:fld id="{A37A7497-B40A-2944-AF6C-6A4B11C9A644}" type="datetimeFigureOut">
               <a:rPr lang="en-US" smtClean="0"/>
-              <a:t>5/16/18</a:t>
+              <a:pPr/>
+              <a:t>5/17/2018</a:t>
             </a:fld>
             <a:endParaRPr lang="en-US"/>
           </a:p>
@@ -1166,7 +1175,8 @@
           <a:p>
             <a:fld id="{8E4E1ED5-99F9-634F-AEAC-E940F1B4F904}" type="slidenum">
               <a:rPr lang="en-US" smtClean="0"/>
-              <a:t>‹#›</a:t>
+              <a:pPr/>
+              <a:t>‹Nr.›</a:t>
             </a:fld>
             <a:endParaRPr lang="en-US"/>
           </a:p>
@@ -1363,7 +1373,8 @@
           <a:p>
             <a:fld id="{A37A7497-B40A-2944-AF6C-6A4B11C9A644}" type="datetimeFigureOut">
               <a:rPr lang="en-US" smtClean="0"/>
-              <a:t>5/16/18</a:t>
+              <a:pPr/>
+              <a:t>5/17/2018</a:t>
             </a:fld>
             <a:endParaRPr lang="en-US"/>
           </a:p>
@@ -1405,7 +1416,8 @@
           <a:p>
             <a:fld id="{8E4E1ED5-99F9-634F-AEAC-E940F1B4F904}" type="slidenum">
               <a:rPr lang="en-US" smtClean="0"/>
-              <a:t>‹#›</a:t>
+              <a:pPr/>
+              <a:t>‹Nr.›</a:t>
             </a:fld>
             <a:endParaRPr lang="en-US"/>
           </a:p>
@@ -1590,7 +1602,8 @@
           <a:p>
             <a:fld id="{A37A7497-B40A-2944-AF6C-6A4B11C9A644}" type="datetimeFigureOut">
               <a:rPr lang="en-US" smtClean="0"/>
-              <a:t>5/16/18</a:t>
+              <a:pPr/>
+              <a:t>5/17/2018</a:t>
             </a:fld>
             <a:endParaRPr lang="en-US"/>
           </a:p>
@@ -1632,7 +1645,8 @@
           <a:p>
             <a:fld id="{8E4E1ED5-99F9-634F-AEAC-E940F1B4F904}" type="slidenum">
               <a:rPr lang="en-US" smtClean="0"/>
-              <a:t>‹#›</a:t>
+              <a:pPr/>
+              <a:t>‹Nr.›</a:t>
             </a:fld>
             <a:endParaRPr lang="en-US"/>
           </a:p>
@@ -1952,7 +1966,8 @@
           <a:p>
             <a:fld id="{A37A7497-B40A-2944-AF6C-6A4B11C9A644}" type="datetimeFigureOut">
               <a:rPr lang="en-US" smtClean="0"/>
-              <a:t>5/16/18</a:t>
+              <a:pPr/>
+              <a:t>5/17/2018</a:t>
             </a:fld>
             <a:endParaRPr lang="en-US"/>
           </a:p>
@@ -1994,7 +2009,8 @@
           <a:p>
             <a:fld id="{8E4E1ED5-99F9-634F-AEAC-E940F1B4F904}" type="slidenum">
               <a:rPr lang="en-US" smtClean="0"/>
-              <a:t>‹#›</a:t>
+              <a:pPr/>
+              <a:t>‹Nr.›</a:t>
             </a:fld>
             <a:endParaRPr lang="en-US"/>
           </a:p>
@@ -2065,7 +2081,8 @@
           <a:p>
             <a:fld id="{A37A7497-B40A-2944-AF6C-6A4B11C9A644}" type="datetimeFigureOut">
               <a:rPr lang="en-US" smtClean="0"/>
-              <a:t>5/16/18</a:t>
+              <a:pPr/>
+              <a:t>5/17/2018</a:t>
             </a:fld>
             <a:endParaRPr lang="en-US"/>
           </a:p>
@@ -2107,7 +2124,8 @@
           <a:p>
             <a:fld id="{8E4E1ED5-99F9-634F-AEAC-E940F1B4F904}" type="slidenum">
               <a:rPr lang="en-US" smtClean="0"/>
-              <a:t>‹#›</a:t>
+              <a:pPr/>
+              <a:t>‹Nr.›</a:t>
             </a:fld>
             <a:endParaRPr lang="en-US"/>
           </a:p>
@@ -2155,7 +2173,8 @@
           <a:p>
             <a:fld id="{A37A7497-B40A-2944-AF6C-6A4B11C9A644}" type="datetimeFigureOut">
               <a:rPr lang="en-US" smtClean="0"/>
-              <a:t>5/16/18</a:t>
+              <a:pPr/>
+              <a:t>5/17/2018</a:t>
             </a:fld>
             <a:endParaRPr lang="en-US"/>
           </a:p>
@@ -2197,7 +2216,8 @@
           <a:p>
             <a:fld id="{8E4E1ED5-99F9-634F-AEAC-E940F1B4F904}" type="slidenum">
               <a:rPr lang="en-US" smtClean="0"/>
-              <a:t>‹#›</a:t>
+              <a:pPr/>
+              <a:t>‹Nr.›</a:t>
             </a:fld>
             <a:endParaRPr lang="en-US"/>
           </a:p>
@@ -2427,7 +2447,8 @@
           <a:p>
             <a:fld id="{A37A7497-B40A-2944-AF6C-6A4B11C9A644}" type="datetimeFigureOut">
               <a:rPr lang="en-US" smtClean="0"/>
-              <a:t>5/16/18</a:t>
+              <a:pPr/>
+              <a:t>5/17/2018</a:t>
             </a:fld>
             <a:endParaRPr lang="en-US"/>
           </a:p>
@@ -2469,7 +2490,8 @@
           <a:p>
             <a:fld id="{8E4E1ED5-99F9-634F-AEAC-E940F1B4F904}" type="slidenum">
               <a:rPr lang="en-US" smtClean="0"/>
-              <a:t>‹#›</a:t>
+              <a:pPr/>
+              <a:t>‹Nr.›</a:t>
             </a:fld>
             <a:endParaRPr lang="en-US"/>
           </a:p>
@@ -2679,7 +2701,8 @@
           <a:p>
             <a:fld id="{A37A7497-B40A-2944-AF6C-6A4B11C9A644}" type="datetimeFigureOut">
               <a:rPr lang="en-US" smtClean="0"/>
-              <a:t>5/16/18</a:t>
+              <a:pPr/>
+              <a:t>5/17/2018</a:t>
             </a:fld>
             <a:endParaRPr lang="en-US"/>
           </a:p>
@@ -2721,7 +2744,8 @@
           <a:p>
             <a:fld id="{8E4E1ED5-99F9-634F-AEAC-E940F1B4F904}" type="slidenum">
               <a:rPr lang="en-US" smtClean="0"/>
-              <a:t>‹#›</a:t>
+              <a:pPr/>
+              <a:t>‹Nr.›</a:t>
             </a:fld>
             <a:endParaRPr lang="en-US"/>
           </a:p>
@@ -2887,7 +2911,8 @@
           <a:p>
             <a:fld id="{A37A7497-B40A-2944-AF6C-6A4B11C9A644}" type="datetimeFigureOut">
               <a:rPr lang="en-US" smtClean="0"/>
-              <a:t>5/16/18</a:t>
+              <a:pPr/>
+              <a:t>5/17/2018</a:t>
             </a:fld>
             <a:endParaRPr lang="en-US"/>
           </a:p>
@@ -2965,7 +2990,8 @@
           <a:p>
             <a:fld id="{8E4E1ED5-99F9-634F-AEAC-E940F1B4F904}" type="slidenum">
               <a:rPr lang="en-US" smtClean="0"/>
-              <a:t>‹#›</a:t>
+              <a:pPr/>
+              <a:t>‹Nr.›</a:t>
             </a:fld>
             <a:endParaRPr lang="en-US"/>
           </a:p>
@@ -2974,7 +3000,7 @@
     </p:spTree>
     <p:extLst>
       <p:ext uri="{BB962C8B-B14F-4D97-AF65-F5344CB8AC3E}">
-        <p14:creationId xmlns:p14="http://schemas.microsoft.com/office/powerpoint/2010/main" val="899253639"/>
+        <p14:creationId xmlns:p14="http://schemas.microsoft.com/office/powerpoint/2010/main" xmlns="" val="899253639"/>
       </p:ext>
     </p:extLst>
   </p:cSld>
@@ -3352,13 +3378,20 @@
     </p:spTree>
     <p:extLst>
       <p:ext uri="{BB962C8B-B14F-4D97-AF65-F5344CB8AC3E}">
-        <p14:creationId xmlns:p14="http://schemas.microsoft.com/office/powerpoint/2010/main" val="1435968375"/>
+        <p14:creationId xmlns:p14="http://schemas.microsoft.com/office/powerpoint/2010/main" xmlns="" val="1435968375"/>
       </p:ext>
     </p:extLst>
   </p:cSld>
   <p:clrMapOvr>
     <a:masterClrMapping/>
   </p:clrMapOvr>
+  <p:timing>
+    <p:tnLst>
+      <p:par>
+        <p:cTn id="1" dur="indefinite" restart="never" nodeType="tmRoot"/>
+      </p:par>
+    </p:tnLst>
+  </p:timing>
 </p:sld>
 </file>
 
@@ -3420,7 +3453,7 @@
         <p:spPr/>
         <p:txBody>
           <a:bodyPr>
-            <a:normAutofit fontScale="85000" lnSpcReduction="20000"/>
+            <a:normAutofit fontScale="77500" lnSpcReduction="20000"/>
           </a:bodyPr>
           <a:lstStyle/>
           <a:p>
@@ -3449,7 +3482,15 @@
             </a:pPr>
             <a:r>
               <a:rPr lang="en-US" sz="2500" dirty="0" smtClean="0"/>
-              <a:t>       sites, equipment, sensor points, etc.</a:t>
+              <a:t>     </a:t>
+            </a:r>
+            <a:r>
+              <a:rPr lang="en-US" sz="2500" dirty="0" smtClean="0"/>
+              <a:t> sites</a:t>
+            </a:r>
+            <a:r>
+              <a:rPr lang="en-US" sz="2500" dirty="0" smtClean="0"/>
+              <a:t>, equipment, sensor points, etc.</a:t>
             </a:r>
           </a:p>
           <a:p>
@@ -3498,7 +3539,15 @@
             </a:pPr>
             <a:r>
               <a:rPr lang="en-US" sz="2500" dirty="0" smtClean="0"/>
-              <a:t>       to model a logical grouping, e.g. chiller plant.</a:t>
+              <a:t>      </a:t>
+            </a:r>
+            <a:r>
+              <a:rPr lang="en-US" sz="2500" dirty="0" smtClean="0"/>
+              <a:t>to </a:t>
+            </a:r>
+            <a:r>
+              <a:rPr lang="en-US" sz="2500" dirty="0" smtClean="0"/>
+              <a:t>model a logical grouping, e.g. chiller plant.</a:t>
             </a:r>
           </a:p>
           <a:p>
@@ -3837,7 +3886,7 @@
     </p:spTree>
     <p:extLst>
       <p:ext uri="{BB962C8B-B14F-4D97-AF65-F5344CB8AC3E}">
-        <p14:creationId xmlns:p14="http://schemas.microsoft.com/office/powerpoint/2010/main" val="1540977221"/>
+        <p14:creationId xmlns:p14="http://schemas.microsoft.com/office/powerpoint/2010/main" xmlns="" val="1540977221"/>
       </p:ext>
     </p:extLst>
   </p:cSld>
@@ -3897,14 +3946,14 @@
       </p:sp>
       <p:pic>
         <p:nvPicPr>
-          <p:cNvPr id="1026" name="Picture 2" descr="D:\Work\Work on WoT Embedded Semantic Framework\Repositories\siemens-semantic-models\Haystack-iot.schema\Haystack-iotschema.png"/>
+          <p:cNvPr id="1027" name="Picture 3" descr="D:\Work\Work on WoT Embedded Semantic Framework\Repositories\siemens-semantic-models\Haystack-iot.schema\Haystack-iotschema.png"/>
           <p:cNvPicPr>
             <a:picLocks noChangeAspect="1" noChangeArrowheads="1"/>
           </p:cNvPicPr>
           <p:nvPr/>
         </p:nvPicPr>
         <p:blipFill>
-          <a:blip r:embed="rId2" cstate="print"/>
+          <a:blip r:embed="rId2"/>
           <a:srcRect/>
           <a:stretch>
             <a:fillRect/>
@@ -3912,8 +3961,8 @@
         </p:blipFill>
         <p:spPr bwMode="auto">
           <a:xfrm>
-            <a:off x="1115616" y="1484784"/>
-            <a:ext cx="6984776" cy="5128063"/>
+            <a:off x="1083452" y="1576386"/>
+            <a:ext cx="6610366" cy="4853180"/>
           </a:xfrm>
           <a:prstGeom prst="rect">
             <a:avLst/>
@@ -3924,7 +3973,7 @@
     </p:spTree>
     <p:extLst>
       <p:ext uri="{BB962C8B-B14F-4D97-AF65-F5344CB8AC3E}">
-        <p14:creationId xmlns:p14="http://schemas.microsoft.com/office/powerpoint/2010/main" val="551370527"/>
+        <p14:creationId xmlns:p14="http://schemas.microsoft.com/office/powerpoint/2010/main" xmlns="" val="551370527"/>
       </p:ext>
     </p:extLst>
   </p:cSld>
@@ -3996,7 +4045,7 @@
         <p:spPr/>
         <p:txBody>
           <a:bodyPr>
-            <a:normAutofit fontScale="77500" lnSpcReduction="20000"/>
+            <a:normAutofit fontScale="85000" lnSpcReduction="20000"/>
           </a:bodyPr>
           <a:lstStyle/>
           <a:p>
@@ -4324,13 +4373,20 @@
     </p:spTree>
     <p:extLst>
       <p:ext uri="{BB962C8B-B14F-4D97-AF65-F5344CB8AC3E}">
-        <p14:creationId xmlns:p14="http://schemas.microsoft.com/office/powerpoint/2010/main" val="492510484"/>
+        <p14:creationId xmlns:p14="http://schemas.microsoft.com/office/powerpoint/2010/main" xmlns="" val="492510484"/>
       </p:ext>
     </p:extLst>
   </p:cSld>
   <p:clrMapOvr>
     <a:masterClrMapping/>
   </p:clrMapOvr>
+  <p:timing>
+    <p:tnLst>
+      <p:par>
+        <p:cTn id="1" dur="indefinite" restart="never" nodeType="tmRoot"/>
+      </p:par>
+    </p:tnLst>
+  </p:timing>
 </p:sld>
 </file>
 
@@ -4389,7 +4445,7 @@
         <p:spPr/>
         <p:txBody>
           <a:bodyPr>
-            <a:normAutofit fontScale="70000" lnSpcReduction="20000"/>
+            <a:normAutofit fontScale="85000" lnSpcReduction="20000"/>
           </a:bodyPr>
           <a:lstStyle/>
           <a:p>
@@ -4907,7 +4963,7 @@
     </p:spTree>
     <p:extLst>
       <p:ext uri="{BB962C8B-B14F-4D97-AF65-F5344CB8AC3E}">
-        <p14:creationId xmlns:p14="http://schemas.microsoft.com/office/powerpoint/2010/main" val="1221729050"/>
+        <p14:creationId xmlns:p14="http://schemas.microsoft.com/office/powerpoint/2010/main" xmlns="" val="1221729050"/>
       </p:ext>
     </p:extLst>
   </p:cSld>
@@ -4983,7 +5039,7 @@
     </p:spTree>
     <p:extLst>
       <p:ext uri="{BB962C8B-B14F-4D97-AF65-F5344CB8AC3E}">
-        <p14:creationId xmlns:p14="http://schemas.microsoft.com/office/powerpoint/2010/main" val="1508994383"/>
+        <p14:creationId xmlns:p14="http://schemas.microsoft.com/office/powerpoint/2010/main" xmlns="" val="1508994383"/>
       </p:ext>
     </p:extLst>
   </p:cSld>
@@ -5100,7 +5156,7 @@
     </p:spTree>
     <p:extLst>
       <p:ext uri="{BB962C8B-B14F-4D97-AF65-F5344CB8AC3E}">
-        <p14:creationId xmlns:p14="http://schemas.microsoft.com/office/powerpoint/2010/main" val="1837432274"/>
+        <p14:creationId xmlns:p14="http://schemas.microsoft.com/office/powerpoint/2010/main" xmlns="" val="1837432274"/>
       </p:ext>
     </p:extLst>
   </p:cSld>
@@ -5238,7 +5294,7 @@
     </p:spTree>
     <p:extLst>
       <p:ext uri="{BB962C8B-B14F-4D97-AF65-F5344CB8AC3E}">
-        <p14:creationId xmlns:p14="http://schemas.microsoft.com/office/powerpoint/2010/main" val="665506004"/>
+        <p14:creationId xmlns:p14="http://schemas.microsoft.com/office/powerpoint/2010/main" xmlns="" val="665506004"/>
       </p:ext>
     </p:extLst>
   </p:cSld>
@@ -5326,7 +5382,7 @@
     </p:spTree>
     <p:extLst>
       <p:ext uri="{BB962C8B-B14F-4D97-AF65-F5344CB8AC3E}">
-        <p14:creationId xmlns:p14="http://schemas.microsoft.com/office/powerpoint/2010/main" val="2115880194"/>
+        <p14:creationId xmlns:p14="http://schemas.microsoft.com/office/powerpoint/2010/main" xmlns="" val="2115880194"/>
       </p:ext>
     </p:extLst>
   </p:cSld>
@@ -5424,7 +5480,7 @@
     </p:spTree>
     <p:extLst>
       <p:ext uri="{BB962C8B-B14F-4D97-AF65-F5344CB8AC3E}">
-        <p14:creationId xmlns:p14="http://schemas.microsoft.com/office/powerpoint/2010/main" val="1003335686"/>
+        <p14:creationId xmlns:p14="http://schemas.microsoft.com/office/powerpoint/2010/main" xmlns="" val="1003335686"/>
       </p:ext>
     </p:extLst>
   </p:cSld>
@@ -5530,7 +5586,7 @@
     </p:spTree>
     <p:extLst>
       <p:ext uri="{BB962C8B-B14F-4D97-AF65-F5344CB8AC3E}">
-        <p14:creationId xmlns:p14="http://schemas.microsoft.com/office/powerpoint/2010/main" val="1567271012"/>
+        <p14:creationId xmlns:p14="http://schemas.microsoft.com/office/powerpoint/2010/main" xmlns="" val="1567271012"/>
       </p:ext>
     </p:extLst>
   </p:cSld>
@@ -5603,11 +5659,7 @@
           <a:p>
             <a:r>
               <a:rPr lang="en-US" dirty="0" smtClean="0"/>
-              <a:t>Updated </a:t>
-            </a:r>
-            <a:r>
-              <a:rPr lang="en-US" dirty="0" smtClean="0"/>
-              <a:t>meta model/ontology with </a:t>
+              <a:t>Updated meta model/ontology with </a:t>
             </a:r>
             <a:r>
               <a:rPr lang="en-US" dirty="0" err="1" smtClean="0"/>
@@ -5640,11 +5692,7 @@
           <a:p>
             <a:r>
               <a:rPr lang="en-US" dirty="0" smtClean="0"/>
-              <a:t>Organizational </a:t>
-            </a:r>
-            <a:r>
-              <a:rPr lang="en-US" dirty="0" smtClean="0"/>
-              <a:t>updates</a:t>
+              <a:t>Organizational updates</a:t>
             </a:r>
           </a:p>
           <a:p>
@@ -5664,13 +5712,20 @@
     </p:spTree>
     <p:extLst>
       <p:ext uri="{BB962C8B-B14F-4D97-AF65-F5344CB8AC3E}">
-        <p14:creationId xmlns:p14="http://schemas.microsoft.com/office/powerpoint/2010/main" val="2020261940"/>
+        <p14:creationId xmlns:p14="http://schemas.microsoft.com/office/powerpoint/2010/main" xmlns="" val="2020261940"/>
       </p:ext>
     </p:extLst>
   </p:cSld>
   <p:clrMapOvr>
     <a:masterClrMapping/>
   </p:clrMapOvr>
+  <p:timing>
+    <p:tnLst>
+      <p:par>
+        <p:cTn id="1" dur="indefinite" restart="never" nodeType="tmRoot"/>
+      </p:par>
+    </p:tnLst>
+  </p:timing>
 </p:sld>
 </file>
 
@@ -5779,7 +5834,7 @@
     </p:spTree>
     <p:extLst>
       <p:ext uri="{BB962C8B-B14F-4D97-AF65-F5344CB8AC3E}">
-        <p14:creationId xmlns:p14="http://schemas.microsoft.com/office/powerpoint/2010/main" val="279690758"/>
+        <p14:creationId xmlns:p14="http://schemas.microsoft.com/office/powerpoint/2010/main" xmlns="" val="279690758"/>
       </p:ext>
     </p:extLst>
   </p:cSld>
@@ -5868,7 +5923,7 @@
     </p:spTree>
     <p:extLst>
       <p:ext uri="{BB962C8B-B14F-4D97-AF65-F5344CB8AC3E}">
-        <p14:creationId xmlns:p14="http://schemas.microsoft.com/office/powerpoint/2010/main" val="1706777517"/>
+        <p14:creationId xmlns:p14="http://schemas.microsoft.com/office/powerpoint/2010/main" xmlns="" val="1706777517"/>
       </p:ext>
     </p:extLst>
   </p:cSld>
@@ -6070,7 +6125,7 @@
     </p:spTree>
     <p:extLst>
       <p:ext uri="{BB962C8B-B14F-4D97-AF65-F5344CB8AC3E}">
-        <p14:creationId xmlns:p14="http://schemas.microsoft.com/office/powerpoint/2010/main" val="465878758"/>
+        <p14:creationId xmlns:p14="http://schemas.microsoft.com/office/powerpoint/2010/main" xmlns="" val="465878758"/>
       </p:ext>
     </p:extLst>
   </p:cSld>
@@ -6197,7 +6252,7 @@
     </p:spTree>
     <p:extLst>
       <p:ext uri="{BB962C8B-B14F-4D97-AF65-F5344CB8AC3E}">
-        <p14:creationId xmlns:p14="http://schemas.microsoft.com/office/powerpoint/2010/main" val="911280416"/>
+        <p14:creationId xmlns:p14="http://schemas.microsoft.com/office/powerpoint/2010/main" xmlns="" val="911280416"/>
       </p:ext>
     </p:extLst>
   </p:cSld>
@@ -6269,7 +6324,7 @@
     </p:spTree>
     <p:extLst>
       <p:ext uri="{BB962C8B-B14F-4D97-AF65-F5344CB8AC3E}">
-        <p14:creationId xmlns:p14="http://schemas.microsoft.com/office/powerpoint/2010/main" val="1258282975"/>
+        <p14:creationId xmlns:p14="http://schemas.microsoft.com/office/powerpoint/2010/main" xmlns="" val="1258282975"/>
       </p:ext>
     </p:extLst>
   </p:cSld>
@@ -6384,7 +6439,7 @@
     </p:spTree>
     <p:extLst>
       <p:ext uri="{BB962C8B-B14F-4D97-AF65-F5344CB8AC3E}">
-        <p14:creationId xmlns:p14="http://schemas.microsoft.com/office/powerpoint/2010/main" val="925745159"/>
+        <p14:creationId xmlns:p14="http://schemas.microsoft.com/office/powerpoint/2010/main" xmlns="" val="925745159"/>
       </p:ext>
     </p:extLst>
   </p:cSld>
@@ -6477,7 +6532,7 @@
     </p:spTree>
     <p:extLst>
       <p:ext uri="{BB962C8B-B14F-4D97-AF65-F5344CB8AC3E}">
-        <p14:creationId xmlns:p14="http://schemas.microsoft.com/office/powerpoint/2010/main" val="479864798"/>
+        <p14:creationId xmlns:p14="http://schemas.microsoft.com/office/powerpoint/2010/main" xmlns="" val="479864798"/>
       </p:ext>
     </p:extLst>
   </p:cSld>
@@ -6602,7 +6657,7 @@
     </p:spTree>
     <p:extLst>
       <p:ext uri="{BB962C8B-B14F-4D97-AF65-F5344CB8AC3E}">
-        <p14:creationId xmlns:p14="http://schemas.microsoft.com/office/powerpoint/2010/main" val="1286565501"/>
+        <p14:creationId xmlns:p14="http://schemas.microsoft.com/office/powerpoint/2010/main" xmlns="" val="1286565501"/>
       </p:ext>
     </p:extLst>
   </p:cSld>
@@ -6689,7 +6744,7 @@
     </p:spTree>
     <p:extLst>
       <p:ext uri="{BB962C8B-B14F-4D97-AF65-F5344CB8AC3E}">
-        <p14:creationId xmlns:p14="http://schemas.microsoft.com/office/powerpoint/2010/main" val="293533664"/>
+        <p14:creationId xmlns:p14="http://schemas.microsoft.com/office/powerpoint/2010/main" xmlns="" val="293533664"/>
       </p:ext>
     </p:extLst>
   </p:cSld>
@@ -6766,7 +6821,7 @@
         </p:spPr>
         <p:txBody>
           <a:bodyPr>
-            <a:normAutofit fontScale="85000" lnSpcReduction="20000"/>
+            <a:normAutofit fontScale="62500" lnSpcReduction="20000"/>
           </a:bodyPr>
           <a:lstStyle/>
           <a:p>
@@ -7244,7 +7299,7 @@
     </p:spTree>
     <p:extLst>
       <p:ext uri="{BB962C8B-B14F-4D97-AF65-F5344CB8AC3E}">
-        <p14:creationId xmlns:p14="http://schemas.microsoft.com/office/powerpoint/2010/main" val="650353689"/>
+        <p14:creationId xmlns:p14="http://schemas.microsoft.com/office/powerpoint/2010/main" xmlns="" val="650353689"/>
       </p:ext>
     </p:extLst>
   </p:cSld>
@@ -7327,7 +7382,7 @@
     </p:spTree>
     <p:extLst>
       <p:ext uri="{BB962C8B-B14F-4D97-AF65-F5344CB8AC3E}">
-        <p14:creationId xmlns:p14="http://schemas.microsoft.com/office/powerpoint/2010/main" val="1950171440"/>
+        <p14:creationId xmlns:p14="http://schemas.microsoft.com/office/powerpoint/2010/main" xmlns="" val="1950171440"/>
       </p:ext>
     </p:extLst>
   </p:cSld>
@@ -7433,13 +7488,20 @@
     </p:spTree>
     <p:extLst>
       <p:ext uri="{BB962C8B-B14F-4D97-AF65-F5344CB8AC3E}">
-        <p14:creationId xmlns:p14="http://schemas.microsoft.com/office/powerpoint/2010/main" val="1635971566"/>
+        <p14:creationId xmlns:p14="http://schemas.microsoft.com/office/powerpoint/2010/main" xmlns="" val="1635971566"/>
       </p:ext>
     </p:extLst>
   </p:cSld>
   <p:clrMapOvr>
     <a:masterClrMapping/>
   </p:clrMapOvr>
+  <p:timing>
+    <p:tnLst>
+      <p:par>
+        <p:cTn id="1" dur="indefinite" restart="never" nodeType="tmRoot"/>
+      </p:par>
+    </p:tnLst>
+  </p:timing>
 </p:sld>
 </file>
 
@@ -7486,7 +7548,7 @@
     </a:clrScheme>
     <a:fontScheme name="Office Theme">
       <a:majorFont>
-        <a:latin typeface="Calibri Light" panose="020F0302020204030204"/>
+        <a:latin typeface="Calibri Light"/>
         <a:ea typeface=""/>
         <a:cs typeface=""/>
         <a:font script="Jpan" typeface="游ゴシック Light"/>
@@ -7521,7 +7583,7 @@
         <a:font script="Geor" typeface="Sylfaen"/>
       </a:majorFont>
       <a:minorFont>
-        <a:latin typeface="Calibri" panose="020F0502020204030204"/>
+        <a:latin typeface="Calibri"/>
         <a:ea typeface=""/>
         <a:cs typeface=""/>
         <a:font script="Jpan" typeface="游ゴシック"/>
@@ -7698,7 +7760,7 @@
   <a:extraClrSchemeLst/>
   <a:extLst>
     <a:ext uri="{05A4C25C-085E-4340-85A3-A5531E510DB2}">
-      <thm15:themeFamily xmlns:thm15="http://schemas.microsoft.com/office/thememl/2012/main" name="Office Theme" id="{62F939B6-93AF-4DB8-9C6B-D6C7DFDC589F}" vid="{4A3C46E8-61CC-4603-A589-7422A47A8E4A}"/>
+      <thm15:themeFamily xmlns:thm15="http://schemas.microsoft.com/office/thememl/2012/main" xmlns="" name="Office Theme" id="{62F939B6-93AF-4DB8-9C6B-D6C7DFDC589F}" vid="{4A3C46E8-61CC-4603-A589-7422A47A8E4A}"/>
     </a:ext>
   </a:extLst>
 </a:theme>
@@ -7747,7 +7809,7 @@
     </a:clrScheme>
     <a:fontScheme name="Office">
       <a:majorFont>
-        <a:latin typeface="Calibri Light" panose="020F0302020204030204"/>
+        <a:latin typeface="Calibri Light"/>
         <a:ea typeface=""/>
         <a:cs typeface=""/>
         <a:font script="Jpan" typeface="Yu Gothic Light"/>
@@ -7782,7 +7844,7 @@
         <a:font script="Geor" typeface="Sylfaen"/>
       </a:majorFont>
       <a:minorFont>
-        <a:latin typeface="Calibri" panose="020F0502020204030204"/>
+        <a:latin typeface="Calibri"/>
         <a:ea typeface=""/>
         <a:cs typeface=""/>
         <a:font script="Jpan" typeface="Yu Gothic"/>
@@ -7959,7 +8021,7 @@
   <a:extraClrSchemeLst/>
   <a:extLst>
     <a:ext uri="{05A4C25C-085E-4340-85A3-A5531E510DB2}">
-      <thm15:themeFamily xmlns:thm15="http://schemas.microsoft.com/office/thememl/2012/main" name="Office Theme" id="{62F939B6-93AF-4DB8-9C6B-D6C7DFDC589F}" vid="{4A3C46E8-61CC-4603-A589-7422A47A8E4A}"/>
+      <thm15:themeFamily xmlns:thm15="http://schemas.microsoft.com/office/thememl/2012/main" xmlns="" name="Office Theme" id="{62F939B6-93AF-4DB8-9C6B-D6C7DFDC589F}" vid="{4A3C46E8-61CC-4603-A589-7422A47A8E4A}"/>
     </a:ext>
   </a:extLst>
 </a:theme>

</xml_diff>

<commit_message>
slides from May teleconference
</commit_message>
<xml_diff>
--- a/iotschema-17may20218.pptx
+++ b/iotschema-17may20218.pptx
@@ -3359,6 +3359,13 @@
   <p:clrMapOvr>
     <a:masterClrMapping/>
   </p:clrMapOvr>
+  <p:timing>
+    <p:tnLst>
+      <p:par>
+        <p:cTn id="1" dur="indefinite" restart="never" nodeType="tmRoot"/>
+      </p:par>
+    </p:tnLst>
+  </p:timing>
 </p:sld>
 </file>
 
@@ -4331,6 +4338,13 @@
   <p:clrMapOvr>
     <a:masterClrMapping/>
   </p:clrMapOvr>
+  <p:timing>
+    <p:tnLst>
+      <p:par>
+        <p:cTn id="1" dur="indefinite" restart="never" nodeType="tmRoot"/>
+      </p:par>
+    </p:tnLst>
+  </p:timing>
 </p:sld>
 </file>
 
@@ -4914,6 +4928,13 @@
   <p:clrMapOvr>
     <a:masterClrMapping/>
   </p:clrMapOvr>
+  <p:timing>
+    <p:tnLst>
+      <p:par>
+        <p:cTn id="1" dur="indefinite" restart="never" nodeType="tmRoot"/>
+      </p:par>
+    </p:tnLst>
+  </p:timing>
 </p:sld>
 </file>
 
@@ -5107,6 +5128,13 @@
   <p:clrMapOvr>
     <a:masterClrMapping/>
   </p:clrMapOvr>
+  <p:timing>
+    <p:tnLst>
+      <p:par>
+        <p:cTn id="1" dur="indefinite" restart="never" nodeType="tmRoot"/>
+      </p:par>
+    </p:tnLst>
+  </p:timing>
 </p:sld>
 </file>
 
@@ -5245,6 +5273,13 @@
   <p:clrMapOvr>
     <a:masterClrMapping/>
   </p:clrMapOvr>
+  <p:timing>
+    <p:tnLst>
+      <p:par>
+        <p:cTn id="1" dur="indefinite" restart="never" nodeType="tmRoot"/>
+      </p:par>
+    </p:tnLst>
+  </p:timing>
 </p:sld>
 </file>
 
@@ -5333,6 +5368,13 @@
   <p:clrMapOvr>
     <a:masterClrMapping/>
   </p:clrMapOvr>
+  <p:timing>
+    <p:tnLst>
+      <p:par>
+        <p:cTn id="1" dur="indefinite" restart="never" nodeType="tmRoot"/>
+      </p:par>
+    </p:tnLst>
+  </p:timing>
 </p:sld>
 </file>
 
@@ -5431,6 +5473,13 @@
   <p:clrMapOvr>
     <a:masterClrMapping/>
   </p:clrMapOvr>
+  <p:timing>
+    <p:tnLst>
+      <p:par>
+        <p:cTn id="1" dur="indefinite" restart="never" nodeType="tmRoot"/>
+      </p:par>
+    </p:tnLst>
+  </p:timing>
 </p:sld>
 </file>
 
@@ -5537,6 +5586,13 @@
   <p:clrMapOvr>
     <a:masterClrMapping/>
   </p:clrMapOvr>
+  <p:timing>
+    <p:tnLst>
+      <p:par>
+        <p:cTn id="1" dur="indefinite" restart="never" nodeType="tmRoot"/>
+      </p:par>
+    </p:tnLst>
+  </p:timing>
 </p:sld>
 </file>
 
@@ -5597,8 +5653,40 @@
           <a:p>
             <a:r>
               <a:rPr lang="en-US" dirty="0" smtClean="0"/>
-              <a:t>Review the agenda, items to add</a:t>
-            </a:r>
+              <a:t>Review the agenda, items to </a:t>
+            </a:r>
+            <a:r>
+              <a:rPr lang="en-US" dirty="0" smtClean="0"/>
+              <a:t>add</a:t>
+            </a:r>
+          </a:p>
+          <a:p>
+            <a:pPr lvl="1"/>
+            <a:r>
+              <a:rPr lang="en-US" dirty="0"/>
+              <a:t>J</a:t>
+            </a:r>
+            <a:r>
+              <a:rPr lang="en-US" dirty="0" smtClean="0"/>
+              <a:t>ason </a:t>
+            </a:r>
+            <a:r>
+              <a:rPr lang="en-US" dirty="0" err="1" smtClean="0"/>
+              <a:t>Koh</a:t>
+            </a:r>
+            <a:r>
+              <a:rPr lang="en-US" dirty="0" smtClean="0"/>
+              <a:t> </a:t>
+            </a:r>
+            <a:r>
+              <a:rPr lang="mr-IN" dirty="0" smtClean="0"/>
+              <a:t>–</a:t>
+            </a:r>
+            <a:r>
+              <a:rPr lang="en-US" dirty="0" smtClean="0"/>
+              <a:t> Brick Ontology (added below)</a:t>
+            </a:r>
+            <a:endParaRPr lang="en-US" dirty="0" smtClean="0"/>
           </a:p>
           <a:p>
             <a:r>
@@ -5623,6 +5711,13 @@
             <a:r>
               <a:rPr lang="en-US" dirty="0" err="1" smtClean="0"/>
               <a:t>iot.schema.org</a:t>
+            </a:r>
+            <a:endParaRPr lang="en-US" dirty="0" smtClean="0"/>
+          </a:p>
+          <a:p>
+            <a:r>
+              <a:rPr lang="en-US" dirty="0" smtClean="0"/>
+              <a:t>Brick Ontology</a:t>
             </a:r>
             <a:endParaRPr lang="en-US" dirty="0" smtClean="0"/>
           </a:p>
@@ -5671,6 +5766,13 @@
   <p:clrMapOvr>
     <a:masterClrMapping/>
   </p:clrMapOvr>
+  <p:timing>
+    <p:tnLst>
+      <p:par>
+        <p:cTn id="1" dur="indefinite" restart="never" nodeType="tmRoot"/>
+      </p:par>
+    </p:tnLst>
+  </p:timing>
 </p:sld>
 </file>
 
@@ -5786,6 +5888,13 @@
   <p:clrMapOvr>
     <a:masterClrMapping/>
   </p:clrMapOvr>
+  <p:timing>
+    <p:tnLst>
+      <p:par>
+        <p:cTn id="1" dur="indefinite" restart="never" nodeType="tmRoot"/>
+      </p:par>
+    </p:tnLst>
+  </p:timing>
 </p:sld>
 </file>
 
@@ -5875,6 +5984,13 @@
   <p:clrMapOvr>
     <a:masterClrMapping/>
   </p:clrMapOvr>
+  <p:timing>
+    <p:tnLst>
+      <p:par>
+        <p:cTn id="1" dur="indefinite" restart="never" nodeType="tmRoot"/>
+      </p:par>
+    </p:tnLst>
+  </p:timing>
 </p:sld>
 </file>
 
@@ -6077,6 +6193,13 @@
   <p:clrMapOvr>
     <a:masterClrMapping/>
   </p:clrMapOvr>
+  <p:timing>
+    <p:tnLst>
+      <p:par>
+        <p:cTn id="1" dur="indefinite" restart="never" nodeType="tmRoot"/>
+      </p:par>
+    </p:tnLst>
+  </p:timing>
 </p:sld>
 </file>
 
@@ -6204,6 +6327,13 @@
   <p:clrMapOvr>
     <a:masterClrMapping/>
   </p:clrMapOvr>
+  <p:timing>
+    <p:tnLst>
+      <p:par>
+        <p:cTn id="1" dur="indefinite" restart="never" nodeType="tmRoot"/>
+      </p:par>
+    </p:tnLst>
+  </p:timing>
 </p:sld>
 </file>
 
@@ -6276,6 +6406,13 @@
   <p:clrMapOvr>
     <a:masterClrMapping/>
   </p:clrMapOvr>
+  <p:timing>
+    <p:tnLst>
+      <p:par>
+        <p:cTn id="1" dur="indefinite" restart="never" nodeType="tmRoot"/>
+      </p:par>
+    </p:tnLst>
+  </p:timing>
 </p:sld>
 </file>
 
@@ -7440,6 +7577,13 @@
   <p:clrMapOvr>
     <a:masterClrMapping/>
   </p:clrMapOvr>
+  <p:timing>
+    <p:tnLst>
+      <p:par>
+        <p:cTn id="1" dur="indefinite" restart="never" nodeType="tmRoot"/>
+      </p:par>
+    </p:tnLst>
+  </p:timing>
 </p:sld>
 </file>
 

</xml_diff>